<commit_message>
Add link on github
</commit_message>
<xml_diff>
--- a/Docker for Frontend Devs.pptx
+++ b/Docker for Frontend Devs.pptx
@@ -4809,6 +4809,74 @@
               <a:buSzTx/>
               <a:buNone/>
             </a:pPr>
+            <a:endParaRPr lang="en-US" dirty="0" smtClean="0"/>
+          </a:p>
+          <a:p>
+            <a:pPr marL="0" lvl="0" indent="0" defTabSz="914400">
+              <a:lnSpc>
+                <a:spcPct val="100000"/>
+              </a:lnSpc>
+              <a:spcAft>
+                <a:spcPts val="0"/>
+              </a:spcAft>
+              <a:buSzTx/>
+              <a:buNone/>
+            </a:pPr>
+            <a:endParaRPr lang="en-US" dirty="0"/>
+          </a:p>
+          <a:p>
+            <a:pPr marL="0" lvl="0" indent="0" defTabSz="914400">
+              <a:lnSpc>
+                <a:spcPct val="100000"/>
+              </a:lnSpc>
+              <a:spcAft>
+                <a:spcPts val="0"/>
+              </a:spcAft>
+              <a:buSzTx/>
+              <a:buNone/>
+            </a:pPr>
+            <a:r>
+              <a:rPr lang="en-US" dirty="0">
+                <a:hlinkClick r:id="rId6"/>
+              </a:rPr>
+              <a:t>https://</a:t>
+            </a:r>
+            <a:r>
+              <a:rPr lang="en-US" dirty="0" smtClean="0">
+                <a:hlinkClick r:id="rId6"/>
+              </a:rPr>
+              <a:t>github.com/AlejandroDelRioAlbrechet/docker-epam</a:t>
+            </a:r>
+            <a:endParaRPr lang="en-US" dirty="0" smtClean="0"/>
+          </a:p>
+          <a:p>
+            <a:pPr marL="0" lvl="0" indent="0" defTabSz="914400">
+              <a:lnSpc>
+                <a:spcPct val="100000"/>
+              </a:lnSpc>
+              <a:spcAft>
+                <a:spcPts val="0"/>
+              </a:spcAft>
+              <a:buSzTx/>
+              <a:buNone/>
+            </a:pPr>
+            <a:endParaRPr lang="en-US" dirty="0"/>
+          </a:p>
+          <a:p>
+            <a:pPr marL="0" lvl="0" indent="0" defTabSz="914400">
+              <a:lnSpc>
+                <a:spcPct val="100000"/>
+              </a:lnSpc>
+              <a:spcAft>
+                <a:spcPts val="0"/>
+              </a:spcAft>
+              <a:buSzTx/>
+              <a:buNone/>
+            </a:pPr>
+            <a:r>
+              <a:rPr lang="en-US" smtClean="0"/>
+              <a:t>Resources can be found here</a:t>
+            </a:r>
             <a:endParaRPr lang="en-US" dirty="0"/>
           </a:p>
         </p:txBody>
@@ -5729,15 +5797,7 @@
           <a:p>
             <a:r>
               <a:rPr lang="en-US" dirty="0" smtClean="0"/>
-              <a:t>Lets Review few </a:t>
-            </a:r>
-            <a:r>
-              <a:rPr lang="en-US" dirty="0" smtClean="0"/>
-              <a:t>basic commands </a:t>
-            </a:r>
-            <a:r>
-              <a:rPr lang="en-US" dirty="0" smtClean="0"/>
-              <a:t>which required for frontend developers</a:t>
+              <a:t>Lets Review few basic commands which required for frontend developers</a:t>
             </a:r>
             <a:endParaRPr lang="en-US" dirty="0"/>
           </a:p>
@@ -5951,7 +6011,6 @@
               <a:rPr lang="en-US" sz="2000" dirty="0" smtClean="0"/>
               <a:t>history</a:t>
             </a:r>
-            <a:endParaRPr lang="en-US" sz="2000" dirty="0" smtClean="0"/>
           </a:p>
           <a:p>
             <a:pPr marL="285750" indent="-285750" algn="just">
@@ -6318,11 +6377,6 @@
               </a:rPr>
               <a:t>}</a:t>
             </a:r>
-            <a:endParaRPr lang="en-US" b="1" dirty="0" smtClean="0">
-              <a:solidFill>
-                <a:srgbClr val="444444"/>
-              </a:solidFill>
-            </a:endParaRPr>
           </a:p>
         </p:txBody>
       </p:sp>

</xml_diff>

<commit_message>
Final Version of Presentation
</commit_message>
<xml_diff>
--- a/Docker for Frontend Devs.pptx
+++ b/Docker for Frontend Devs.pptx
@@ -389,7 +389,7 @@
           <a:p>
             <a:fld id="{7F5E9BF7-95E4-A242-BA1D-05FDCF603BE6}" type="datetime1">
               <a:rPr lang="en-US" smtClean="0"/>
-              <a:t>12/6/16</a:t>
+              <a:t>12/15/16</a:t>
             </a:fld>
             <a:endParaRPr lang="en-US"/>
           </a:p>
@@ -555,7 +555,7 @@
           <a:p>
             <a:fld id="{165DBCB1-0306-AD41-9452-11E7C08D5C04}" type="datetime1">
               <a:rPr lang="en-US" smtClean="0"/>
-              <a:t>12/6/16</a:t>
+              <a:t>12/15/16</a:t>
             </a:fld>
             <a:endParaRPr lang="en-US"/>
           </a:p>
@@ -4822,30 +4822,17 @@
               <a:buSzTx/>
               <a:buNone/>
             </a:pPr>
-            <a:endParaRPr lang="en-US" dirty="0"/>
-          </a:p>
-          <a:p>
-            <a:pPr marL="0" lvl="0" indent="0" defTabSz="914400">
-              <a:lnSpc>
-                <a:spcPct val="100000"/>
-              </a:lnSpc>
-              <a:spcAft>
-                <a:spcPts val="0"/>
-              </a:spcAft>
-              <a:buSzTx/>
-              <a:buNone/>
-            </a:pPr>
             <a:r>
               <a:rPr lang="en-US" dirty="0">
                 <a:hlinkClick r:id="rId6"/>
               </a:rPr>
-              <a:t>https://</a:t>
+              <a:t>https://hub.docker.com/explore</a:t>
             </a:r>
             <a:r>
               <a:rPr lang="en-US" dirty="0" smtClean="0">
                 <a:hlinkClick r:id="rId6"/>
               </a:rPr>
-              <a:t>github.com/AlejandroDelRioAlbrechet/docker-epam</a:t>
+              <a:t>/</a:t>
             </a:r>
             <a:endParaRPr lang="en-US" dirty="0" smtClean="0"/>
           </a:p>
@@ -4874,9 +4861,30 @@
               <a:buNone/>
             </a:pPr>
             <a:r>
-              <a:rPr lang="en-US" smtClean="0"/>
-              <a:t>Resources can be found here</a:t>
-            </a:r>
+              <a:rPr lang="en-US" dirty="0">
+                <a:hlinkClick r:id="rId7"/>
+              </a:rPr>
+              <a:t>https://</a:t>
+            </a:r>
+            <a:r>
+              <a:rPr lang="en-US" dirty="0" smtClean="0">
+                <a:hlinkClick r:id="rId7"/>
+              </a:rPr>
+              <a:t>github.com/AlejandroDelRioAlbrechet/docker-epam</a:t>
+            </a:r>
+            <a:endParaRPr lang="en-US" dirty="0" smtClean="0"/>
+          </a:p>
+          <a:p>
+            <a:pPr marL="0" lvl="0" indent="0" defTabSz="914400">
+              <a:lnSpc>
+                <a:spcPct val="100000"/>
+              </a:lnSpc>
+              <a:spcAft>
+                <a:spcPts val="0"/>
+              </a:spcAft>
+              <a:buSzTx/>
+              <a:buNone/>
+            </a:pPr>
             <a:endParaRPr lang="en-US" dirty="0"/>
           </a:p>
         </p:txBody>
@@ -5194,6 +5202,40 @@
               <a:rPr lang="en-US" dirty="0"/>
               <a:t>Docker containers wrap a piece of software in a complete filesystem that contains everything needed to run: code, runtime, system tools, system libraries – anything that can be installed on a server. This guarantees that the software will always run the same, regardless of its environment. </a:t>
             </a:r>
+            <a:endParaRPr lang="en-US" dirty="0" smtClean="0"/>
+          </a:p>
+          <a:p>
+            <a:endParaRPr lang="en-US" dirty="0"/>
+          </a:p>
+          <a:p>
+            <a:r>
+              <a:rPr lang="en-US" dirty="0" smtClean="0">
+                <a:hlinkClick r:id="rId3"/>
+              </a:rPr>
+              <a:t>Docker at EPAM https</a:t>
+            </a:r>
+            <a:r>
+              <a:rPr lang="en-US" dirty="0">
+                <a:hlinkClick r:id="rId3"/>
+              </a:rPr>
+              <a:t>://</a:t>
+            </a:r>
+            <a:r>
+              <a:rPr lang="en-US" dirty="0" smtClean="0">
+                <a:hlinkClick r:id="rId3"/>
+              </a:rPr>
+              <a:t>techradar.epam.com/home</a:t>
+            </a:r>
+            <a:r>
+              <a:rPr lang="en-US" dirty="0" smtClean="0"/>
+              <a:t> </a:t>
+            </a:r>
+          </a:p>
+          <a:p>
+            <a:r>
+              <a:rPr lang="en-US" dirty="0"/>
+              <a:t/>
+            </a:r>
             <a:br>
               <a:rPr lang="en-US" dirty="0"/>
             </a:br>
@@ -5250,7 +5292,7 @@
           <p:nvPr/>
         </p:nvPicPr>
         <p:blipFill>
-          <a:blip r:embed="rId3">
+          <a:blip r:embed="rId4">
             <a:extLst>
               <a:ext uri="{28A0092B-C50C-407E-A947-70E740481C1C}">
                 <a14:useLocalDpi xmlns:a14="http://schemas.microsoft.com/office/drawing/2010/main" val="0"/>
@@ -5265,6 +5307,36 @@
           <a:xfrm>
             <a:off x="2506980" y="0"/>
             <a:ext cx="2617022" cy="625476"/>
+          </a:xfrm>
+          <a:prstGeom prst="rect">
+            <a:avLst/>
+          </a:prstGeom>
+        </p:spPr>
+      </p:pic>
+      <p:pic>
+        <p:nvPicPr>
+          <p:cNvPr id="3" name="Picture 2"/>
+          <p:cNvPicPr>
+            <a:picLocks noChangeAspect="1"/>
+          </p:cNvPicPr>
+          <p:nvPr/>
+        </p:nvPicPr>
+        <p:blipFill>
+          <a:blip r:embed="rId5">
+            <a:extLst>
+              <a:ext uri="{28A0092B-C50C-407E-A947-70E740481C1C}">
+                <a14:useLocalDpi xmlns:a14="http://schemas.microsoft.com/office/drawing/2010/main" val="0"/>
+              </a:ext>
+            </a:extLst>
+          </a:blip>
+          <a:stretch>
+            <a:fillRect/>
+          </a:stretch>
+        </p:blipFill>
+        <p:spPr>
+          <a:xfrm>
+            <a:off x="5124002" y="3180386"/>
+            <a:ext cx="2444302" cy="3322723"/>
           </a:xfrm>
           <a:prstGeom prst="rect">
             <a:avLst/>
@@ -5396,6 +5468,13 @@
   <p:clrMapOvr>
     <a:masterClrMapping/>
   </p:clrMapOvr>
+  <p:timing>
+    <p:tnLst>
+      <p:par>
+        <p:cTn id="1" dur="indefinite" restart="never" nodeType="tmRoot"/>
+      </p:par>
+    </p:tnLst>
+  </p:timing>
 </p:sld>
 </file>
 
@@ -5526,6 +5605,13 @@
   <p:clrMapOvr>
     <a:masterClrMapping/>
   </p:clrMapOvr>
+  <p:timing>
+    <p:tnLst>
+      <p:par>
+        <p:cTn id="1" dur="indefinite" restart="never" nodeType="tmRoot"/>
+      </p:par>
+    </p:tnLst>
+  </p:timing>
 </p:sld>
 </file>
 
@@ -5754,7 +5840,7 @@
         <p:spPr>
           <a:xfrm>
             <a:off x="223520" y="833120"/>
-            <a:ext cx="8727440" cy="738664"/>
+            <a:ext cx="8727440" cy="1384995"/>
           </a:xfrm>
           <a:prstGeom prst="rect">
             <a:avLst/>
@@ -5790,6 +5876,28 @@
               <a:t>www.docker.com/products/docker</a:t>
             </a:r>
             <a:endParaRPr lang="en-US" dirty="0" smtClean="0"/>
+          </a:p>
+          <a:p>
+            <a:endParaRPr lang="en-US" dirty="0" smtClean="0"/>
+          </a:p>
+          <a:p>
+            <a:pPr lvl="0"/>
+            <a:r>
+              <a:rPr lang="en-US" dirty="0">
+                <a:hlinkClick r:id="rId3"/>
+              </a:rPr>
+              <a:t>https://hub.docker.com</a:t>
+            </a:r>
+            <a:r>
+              <a:rPr lang="en-US">
+                <a:hlinkClick r:id="rId3"/>
+              </a:rPr>
+              <a:t>/explore/</a:t>
+            </a:r>
+            <a:endParaRPr lang="en-US"/>
+          </a:p>
+          <a:p>
+            <a:endParaRPr lang="en-US"/>
           </a:p>
           <a:p>
             <a:endParaRPr lang="en-US" dirty="0"/>
@@ -5813,6 +5921,13 @@
   <p:clrMapOvr>
     <a:masterClrMapping/>
   </p:clrMapOvr>
+  <p:timing>
+    <p:tnLst>
+      <p:par>
+        <p:cTn id="1" dur="indefinite" restart="never" nodeType="tmRoot"/>
+      </p:par>
+    </p:tnLst>
+  </p:timing>
 </p:sld>
 </file>
 

</xml_diff>